<commit_message>
Seeders and creating a room logic
</commit_message>
<xml_diff>
--- a/Programmingo project.pptx
+++ b/Programmingo project.pptx
@@ -6594,10 +6594,10 @@
               <a:buNone/>
             </a:pPr>
             <a:r>
-              <a:rPr lang="en"/>
+              <a:rPr lang="en" dirty="0"/>
               <a:t>Starting guide</a:t>
             </a:r>
-            <a:endParaRPr/>
+            <a:endParaRPr dirty="0"/>
           </a:p>
         </p:txBody>
       </p:sp>
@@ -6692,10 +6692,18 @@
               <a:buNone/>
             </a:pPr>
             <a:r>
-              <a:rPr lang="en" dirty="0"/>
+              <a:rPr lang="en" dirty="0">
+                <a:highlight>
+                  <a:srgbClr val="00FF00"/>
+                </a:highlight>
+              </a:rPr>
               <a:t>Add middleware needed for the application. Decide on your own. Ask if you get stuck.</a:t>
             </a:r>
-            <a:endParaRPr dirty="0"/>
+            <a:endParaRPr dirty="0">
+              <a:highlight>
+                <a:srgbClr val="00FF00"/>
+              </a:highlight>
+            </a:endParaRPr>
           </a:p>
           <a:p>
             <a:pPr marL="0" lvl="0" indent="0" algn="l" rtl="0">
@@ -6873,10 +6881,18 @@
               <a:buNone/>
             </a:pPr>
             <a:r>
-              <a:rPr lang="en" dirty="0"/>
+              <a:rPr lang="en" dirty="0">
+                <a:highlight>
+                  <a:srgbClr val="00FF00"/>
+                </a:highlight>
+              </a:rPr>
               <a:t>Users -&gt;</a:t>
             </a:r>
-            <a:endParaRPr dirty="0"/>
+            <a:endParaRPr dirty="0">
+              <a:highlight>
+                <a:srgbClr val="00FF00"/>
+              </a:highlight>
+            </a:endParaRPr>
           </a:p>
           <a:p>
             <a:pPr marL="914400" lvl="0" indent="-308610" algn="l" rtl="0">
@@ -6890,10 +6906,18 @@
               <a:buChar char="-"/>
             </a:pPr>
             <a:r>
-              <a:rPr lang="en" dirty="0"/>
+              <a:rPr lang="en" dirty="0">
+                <a:highlight>
+                  <a:srgbClr val="00FF00"/>
+                </a:highlight>
+              </a:rPr>
               <a:t>Admin</a:t>
             </a:r>
-            <a:endParaRPr dirty="0"/>
+            <a:endParaRPr dirty="0">
+              <a:highlight>
+                <a:srgbClr val="00FF00"/>
+              </a:highlight>
+            </a:endParaRPr>
           </a:p>
           <a:p>
             <a:pPr marL="914400" lvl="0" indent="-308610" algn="l" rtl="0">
@@ -6907,10 +6931,18 @@
               <a:buChar char="-"/>
             </a:pPr>
             <a:r>
-              <a:rPr lang="en" dirty="0"/>
+              <a:rPr lang="en" dirty="0">
+                <a:highlight>
+                  <a:srgbClr val="00FF00"/>
+                </a:highlight>
+              </a:rPr>
               <a:t>Room manager</a:t>
             </a:r>
-            <a:endParaRPr dirty="0"/>
+            <a:endParaRPr dirty="0">
+              <a:highlight>
+                <a:srgbClr val="00FF00"/>
+              </a:highlight>
+            </a:endParaRPr>
           </a:p>
           <a:p>
             <a:pPr marL="914400" lvl="0" indent="-308610" algn="l" rtl="0">
@@ -6924,10 +6956,18 @@
               <a:buChar char="-"/>
             </a:pPr>
             <a:r>
-              <a:rPr lang="en" dirty="0"/>
+              <a:rPr lang="en" dirty="0">
+                <a:highlight>
+                  <a:srgbClr val="00FF00"/>
+                </a:highlight>
+              </a:rPr>
               <a:t>Client</a:t>
             </a:r>
-            <a:endParaRPr dirty="0"/>
+            <a:endParaRPr dirty="0">
+              <a:highlight>
+                <a:srgbClr val="00FF00"/>
+              </a:highlight>
+            </a:endParaRPr>
           </a:p>
           <a:p>
             <a:pPr marL="0" lvl="0" indent="0" algn="l" rtl="0">
@@ -6940,10 +6980,18 @@
               <a:buNone/>
             </a:pPr>
             <a:r>
-              <a:rPr lang="en" dirty="0"/>
+              <a:rPr lang="en" dirty="0">
+                <a:highlight>
+                  <a:srgbClr val="00FF00"/>
+                </a:highlight>
+              </a:rPr>
               <a:t>Desks -&gt; </a:t>
             </a:r>
-            <a:endParaRPr dirty="0"/>
+            <a:endParaRPr dirty="0">
+              <a:highlight>
+                <a:srgbClr val="00FF00"/>
+              </a:highlight>
+            </a:endParaRPr>
           </a:p>
           <a:p>
             <a:pPr marL="0" lvl="0" indent="0" algn="l" rtl="0">
@@ -6956,10 +7004,18 @@
               <a:buNone/>
             </a:pPr>
             <a:r>
-              <a:rPr lang="en" dirty="0"/>
+              <a:rPr lang="en" dirty="0">
+                <a:highlight>
+                  <a:srgbClr val="00FF00"/>
+                </a:highlight>
+              </a:rPr>
               <a:t>Rooms -&gt;</a:t>
             </a:r>
-            <a:endParaRPr dirty="0"/>
+            <a:endParaRPr dirty="0">
+              <a:highlight>
+                <a:srgbClr val="00FF00"/>
+              </a:highlight>
+            </a:endParaRPr>
           </a:p>
           <a:p>
             <a:pPr marL="914400" lvl="0" indent="-308610" algn="l" rtl="0">
@@ -6973,10 +7029,18 @@
               <a:buChar char="-"/>
             </a:pPr>
             <a:r>
-              <a:rPr lang="en" dirty="0"/>
+              <a:rPr lang="en" dirty="0">
+                <a:highlight>
+                  <a:srgbClr val="00FF00"/>
+                </a:highlight>
+              </a:rPr>
               <a:t>Small room</a:t>
             </a:r>
-            <a:endParaRPr dirty="0"/>
+            <a:endParaRPr dirty="0">
+              <a:highlight>
+                <a:srgbClr val="00FF00"/>
+              </a:highlight>
+            </a:endParaRPr>
           </a:p>
           <a:p>
             <a:pPr marL="914400" lvl="0" indent="-308610" algn="l" rtl="0">
@@ -6990,10 +7054,18 @@
               <a:buChar char="-"/>
             </a:pPr>
             <a:r>
-              <a:rPr lang="en" dirty="0"/>
+              <a:rPr lang="en" dirty="0">
+                <a:highlight>
+                  <a:srgbClr val="00FF00"/>
+                </a:highlight>
+              </a:rPr>
               <a:t>Big room</a:t>
             </a:r>
-            <a:endParaRPr dirty="0"/>
+            <a:endParaRPr dirty="0">
+              <a:highlight>
+                <a:srgbClr val="00FF00"/>
+              </a:highlight>
+            </a:endParaRPr>
           </a:p>
           <a:p>
             <a:pPr marL="0" lvl="0" indent="0" algn="l" rtl="0">
@@ -7006,10 +7078,18 @@
               <a:buNone/>
             </a:pPr>
             <a:r>
-              <a:rPr lang="en" dirty="0"/>
+              <a:rPr lang="en" dirty="0">
+                <a:highlight>
+                  <a:srgbClr val="00FF00"/>
+                </a:highlight>
+              </a:rPr>
               <a:t>(add any other if you find necessary)</a:t>
             </a:r>
-            <a:endParaRPr dirty="0"/>
+            <a:endParaRPr dirty="0">
+              <a:highlight>
+                <a:srgbClr val="00FF00"/>
+              </a:highlight>
+            </a:endParaRPr>
           </a:p>
           <a:p>
             <a:pPr marL="0" lvl="0" indent="0" algn="l" rtl="0">
@@ -7038,10 +7118,18 @@
               <a:buNone/>
             </a:pPr>
             <a:r>
-              <a:rPr lang="en" dirty="0"/>
+              <a:rPr lang="en" dirty="0">
+                <a:highlight>
+                  <a:srgbClr val="00FF00"/>
+                </a:highlight>
+              </a:rPr>
               <a:t>Rooms have types: Small, Big</a:t>
             </a:r>
-            <a:endParaRPr dirty="0"/>
+            <a:endParaRPr dirty="0">
+              <a:highlight>
+                <a:srgbClr val="00FF00"/>
+              </a:highlight>
+            </a:endParaRPr>
           </a:p>
         </p:txBody>
       </p:sp>
@@ -7153,7 +7241,7 @@
         </p:spPr>
         <p:txBody>
           <a:bodyPr spcFirstLastPara="1" wrap="square" lIns="91425" tIns="91425" rIns="91425" bIns="91425" anchor="t" anchorCtr="0">
-            <a:normAutofit fontScale="92500"/>
+            <a:normAutofit fontScale="85000" lnSpcReduction="10000"/>
           </a:bodyPr>
           <a:lstStyle/>
           <a:p>
@@ -7167,10 +7255,10 @@
               <a:buNone/>
             </a:pPr>
             <a:r>
-              <a:rPr lang="en"/>
+              <a:rPr lang="en" dirty="0"/>
               <a:t>Admin -&gt; Unlimited rights. (access to all endpoints)</a:t>
             </a:r>
-            <a:endParaRPr/>
+            <a:endParaRPr dirty="0"/>
           </a:p>
           <a:p>
             <a:pPr marL="0" lvl="0" indent="0" algn="l" rtl="0">
@@ -7183,10 +7271,10 @@
               <a:buNone/>
             </a:pPr>
             <a:r>
-              <a:rPr lang="en"/>
+              <a:rPr lang="en" dirty="0"/>
               <a:t>Room Manager -&gt; Has access to the room he manages and all desks inside the room. Does not have access to other rooms.</a:t>
             </a:r>
-            <a:endParaRPr/>
+            <a:endParaRPr dirty="0"/>
           </a:p>
           <a:p>
             <a:pPr marL="0" lvl="0" indent="0" algn="l" rtl="0">
@@ -7199,10 +7287,10 @@
               <a:buNone/>
             </a:pPr>
             <a:r>
-              <a:rPr lang="en"/>
+              <a:rPr lang="en" dirty="0"/>
               <a:t>Client -&gt; Has access to a desk in a room, only if he/she rented it.</a:t>
             </a:r>
-            <a:endParaRPr/>
+            <a:endParaRPr dirty="0"/>
           </a:p>
           <a:p>
             <a:pPr marL="0" lvl="0" indent="0" algn="l" rtl="0">
@@ -7214,7 +7302,7 @@
               </a:spcAft>
               <a:buNone/>
             </a:pPr>
-            <a:endParaRPr/>
+            <a:endParaRPr dirty="0"/>
           </a:p>
           <a:p>
             <a:pPr marL="0" lvl="0" indent="0" algn="l" rtl="0">
@@ -7227,10 +7315,18 @@
               <a:buNone/>
             </a:pPr>
             <a:r>
-              <a:rPr lang="en"/>
+              <a:rPr lang="en" dirty="0">
+                <a:highlight>
+                  <a:srgbClr val="00FF00"/>
+                </a:highlight>
+              </a:rPr>
               <a:t>All have view access to the rooms with desks available.</a:t>
             </a:r>
-            <a:endParaRPr/>
+            <a:endParaRPr dirty="0">
+              <a:highlight>
+                <a:srgbClr val="00FF00"/>
+              </a:highlight>
+            </a:endParaRPr>
           </a:p>
           <a:p>
             <a:pPr marL="0" lvl="0" indent="0" algn="l" rtl="0">
@@ -7243,10 +7339,18 @@
               <a:buNone/>
             </a:pPr>
             <a:r>
-              <a:rPr lang="en"/>
+              <a:rPr lang="en" dirty="0">
+                <a:highlight>
+                  <a:srgbClr val="00FF00"/>
+                </a:highlight>
+              </a:rPr>
               <a:t>(That is the base access structure, change it according to needs)</a:t>
             </a:r>
-            <a:endParaRPr/>
+            <a:endParaRPr dirty="0">
+              <a:highlight>
+                <a:srgbClr val="00FF00"/>
+              </a:highlight>
+            </a:endParaRPr>
           </a:p>
           <a:p>
             <a:pPr marL="0" lvl="0" indent="0" algn="l" rtl="0">
@@ -7259,10 +7363,18 @@
               <a:buNone/>
             </a:pPr>
             <a:r>
-              <a:rPr lang="en"/>
+              <a:rPr lang="en" dirty="0">
+                <a:highlight>
+                  <a:srgbClr val="00FF00"/>
+                </a:highlight>
+              </a:rPr>
               <a:t>All users have name, email, password. Feel free to add anything you think will be useful. </a:t>
             </a:r>
-            <a:endParaRPr/>
+            <a:endParaRPr dirty="0">
+              <a:highlight>
+                <a:srgbClr val="00FF00"/>
+              </a:highlight>
+            </a:endParaRPr>
           </a:p>
         </p:txBody>
       </p:sp>
@@ -7334,10 +7446,18 @@
               <a:buNone/>
             </a:pPr>
             <a:r>
-              <a:rPr lang="en"/>
+              <a:rPr lang="en" dirty="0">
+                <a:highlight>
+                  <a:srgbClr val="00FF00"/>
+                </a:highlight>
+              </a:rPr>
               <a:t>Desk</a:t>
             </a:r>
-            <a:endParaRPr/>
+            <a:endParaRPr dirty="0">
+              <a:highlight>
+                <a:srgbClr val="00FF00"/>
+              </a:highlight>
+            </a:endParaRPr>
           </a:p>
         </p:txBody>
       </p:sp>
@@ -7376,10 +7496,18 @@
               <a:buNone/>
             </a:pPr>
             <a:r>
-              <a:rPr lang="en"/>
+              <a:rPr lang="en" dirty="0">
+                <a:highlight>
+                  <a:srgbClr val="00FF00"/>
+                </a:highlight>
+              </a:rPr>
               <a:t>Can only be used by 1 person.</a:t>
             </a:r>
-            <a:endParaRPr/>
+            <a:endParaRPr dirty="0">
+              <a:highlight>
+                <a:srgbClr val="00FF00"/>
+              </a:highlight>
+            </a:endParaRPr>
           </a:p>
           <a:p>
             <a:pPr marL="0" lvl="0" indent="0" algn="l" rtl="0">
@@ -7392,10 +7520,18 @@
               <a:buNone/>
             </a:pPr>
             <a:r>
-              <a:rPr lang="en"/>
+              <a:rPr lang="en" dirty="0">
+                <a:highlight>
+                  <a:srgbClr val="00FF00"/>
+                </a:highlight>
+              </a:rPr>
               <a:t>Has only 1 room manager.</a:t>
             </a:r>
-            <a:endParaRPr/>
+            <a:endParaRPr dirty="0">
+              <a:highlight>
+                <a:srgbClr val="00FF00"/>
+              </a:highlight>
+            </a:endParaRPr>
           </a:p>
           <a:p>
             <a:pPr marL="0" lvl="0" indent="0" algn="l" rtl="0">
@@ -7408,10 +7544,18 @@
               <a:buNone/>
             </a:pPr>
             <a:r>
-              <a:rPr lang="en"/>
+              <a:rPr lang="en" dirty="0">
+                <a:highlight>
+                  <a:srgbClr val="00FF00"/>
+                </a:highlight>
+              </a:rPr>
               <a:t>Has price, size, position (next to window, next to door, center, etc)</a:t>
             </a:r>
-            <a:endParaRPr/>
+            <a:endParaRPr dirty="0">
+              <a:highlight>
+                <a:srgbClr val="00FF00"/>
+              </a:highlight>
+            </a:endParaRPr>
           </a:p>
           <a:p>
             <a:pPr marL="0" lvl="0" indent="0" algn="l" rtl="0">
@@ -7424,10 +7568,18 @@
               <a:buNone/>
             </a:pPr>
             <a:r>
-              <a:rPr lang="en"/>
+              <a:rPr lang="en" dirty="0">
+                <a:highlight>
+                  <a:srgbClr val="00FF00"/>
+                </a:highlight>
+              </a:rPr>
               <a:t>Has is_taken attribute and time for which it is taken (paid for).</a:t>
             </a:r>
-            <a:endParaRPr/>
+            <a:endParaRPr dirty="0">
+              <a:highlight>
+                <a:srgbClr val="00FF00"/>
+              </a:highlight>
+            </a:endParaRPr>
           </a:p>
           <a:p>
             <a:pPr marL="0" lvl="0" indent="0" algn="l" rtl="0">
@@ -7439,7 +7591,7 @@
               </a:spcAft>
               <a:buNone/>
             </a:pPr>
-            <a:endParaRPr/>
+            <a:endParaRPr dirty="0"/>
           </a:p>
         </p:txBody>
       </p:sp>
@@ -7553,10 +7705,18 @@
               <a:buNone/>
             </a:pPr>
             <a:r>
-              <a:rPr lang="en"/>
+              <a:rPr lang="en" dirty="0">
+                <a:highlight>
+                  <a:srgbClr val="00FF00"/>
+                </a:highlight>
+              </a:rPr>
               <a:t>Have desk_capacity, size (small, big)</a:t>
             </a:r>
-            <a:endParaRPr/>
+            <a:endParaRPr dirty="0">
+              <a:highlight>
+                <a:srgbClr val="00FF00"/>
+              </a:highlight>
+            </a:endParaRPr>
           </a:p>
           <a:p>
             <a:pPr marL="0" lvl="0" indent="0" algn="l" rtl="0">
@@ -7569,10 +7729,10 @@
               <a:buNone/>
             </a:pPr>
             <a:r>
-              <a:rPr lang="en"/>
+              <a:rPr lang="en" dirty="0"/>
               <a:t>Can be left without room manager, in which case Admin is the room manager.</a:t>
             </a:r>
-            <a:endParaRPr/>
+            <a:endParaRPr dirty="0"/>
           </a:p>
           <a:p>
             <a:pPr marL="0" lvl="0" indent="0" algn="l" rtl="0">
@@ -7585,10 +7745,18 @@
               <a:buNone/>
             </a:pPr>
             <a:r>
-              <a:rPr lang="en"/>
+              <a:rPr lang="en" dirty="0">
+                <a:highlight>
+                  <a:srgbClr val="00FF00"/>
+                </a:highlight>
+              </a:rPr>
               <a:t>Can be looked up by everyone for vacant spots. </a:t>
             </a:r>
-            <a:endParaRPr/>
+            <a:endParaRPr dirty="0">
+              <a:highlight>
+                <a:srgbClr val="00FF00"/>
+              </a:highlight>
+            </a:endParaRPr>
           </a:p>
         </p:txBody>
       </p:sp>
@@ -7660,10 +7828,10 @@
               <a:buNone/>
             </a:pPr>
             <a:r>
-              <a:rPr lang="en"/>
+              <a:rPr lang="en" dirty="0"/>
               <a:t>Endpoints</a:t>
             </a:r>
-            <a:endParaRPr/>
+            <a:endParaRPr dirty="0"/>
           </a:p>
         </p:txBody>
       </p:sp>
@@ -7688,7 +7856,7 @@
         </p:spPr>
         <p:txBody>
           <a:bodyPr spcFirstLastPara="1" wrap="square" lIns="91425" tIns="91425" rIns="91425" bIns="91425" anchor="t" anchorCtr="0">
-            <a:normAutofit lnSpcReduction="20000"/>
+            <a:normAutofit fontScale="92500" lnSpcReduction="20000"/>
           </a:bodyPr>
           <a:lstStyle/>
           <a:p>
@@ -7702,10 +7870,18 @@
               <a:buNone/>
             </a:pPr>
             <a:r>
-              <a:rPr lang="en"/>
+              <a:rPr lang="en" dirty="0">
+                <a:highlight>
+                  <a:srgbClr val="00FF00"/>
+                </a:highlight>
+              </a:rPr>
               <a:t>Create Route::resource() for each model</a:t>
             </a:r>
-            <a:endParaRPr/>
+            <a:endParaRPr dirty="0">
+              <a:highlight>
+                <a:srgbClr val="00FF00"/>
+              </a:highlight>
+            </a:endParaRPr>
           </a:p>
           <a:p>
             <a:pPr marL="0" lvl="0" indent="0" algn="l" rtl="0">
@@ -7718,10 +7894,18 @@
               <a:buNone/>
             </a:pPr>
             <a:r>
-              <a:rPr lang="en"/>
+              <a:rPr lang="en" dirty="0">
+                <a:highlight>
+                  <a:srgbClr val="00FF00"/>
+                </a:highlight>
+              </a:rPr>
               <a:t>Info here: https://laravel.com/docs/8.x/controllers#resource-controllers</a:t>
             </a:r>
-            <a:endParaRPr/>
+            <a:endParaRPr dirty="0">
+              <a:highlight>
+                <a:srgbClr val="00FF00"/>
+              </a:highlight>
+            </a:endParaRPr>
           </a:p>
           <a:p>
             <a:pPr marL="0" lvl="0" indent="0" algn="l" rtl="0">
@@ -7733,7 +7917,7 @@
               </a:spcAft>
               <a:buNone/>
             </a:pPr>
-            <a:endParaRPr/>
+            <a:endParaRPr dirty="0"/>
           </a:p>
           <a:p>
             <a:pPr marL="0" lvl="0" indent="0" algn="l" rtl="0">
@@ -7746,10 +7930,9 @@
               <a:buNone/>
             </a:pPr>
             <a:r>
-              <a:rPr lang="en"/>
+              <a:rPr lang="en-US" dirty="0"/>
               <a:t>Admin can create rooms, desks and assign room managers.</a:t>
             </a:r>
-            <a:endParaRPr/>
           </a:p>
           <a:p>
             <a:pPr marL="0" lvl="0" indent="0" algn="l" rtl="0">
@@ -7762,10 +7945,9 @@
               <a:buNone/>
             </a:pPr>
             <a:r>
-              <a:rPr lang="en"/>
+              <a:rPr lang="en-US" dirty="0"/>
               <a:t>Any registered user is Client, until admin makes him/her a room manager.</a:t>
             </a:r>
-            <a:endParaRPr/>
           </a:p>
           <a:p>
             <a:pPr marL="0" lvl="0" indent="0" algn="l" rtl="0">
@@ -7777,7 +7959,7 @@
               </a:spcAft>
               <a:buNone/>
             </a:pPr>
-            <a:endParaRPr/>
+            <a:endParaRPr dirty="0"/>
           </a:p>
           <a:p>
             <a:pPr marL="0" lvl="0" indent="0" algn="l" rtl="0">
@@ -7789,7 +7971,7 @@
               </a:spcAft>
               <a:buNone/>
             </a:pPr>
-            <a:endParaRPr/>
+            <a:endParaRPr dirty="0"/>
           </a:p>
           <a:p>
             <a:pPr marL="0" lvl="0" indent="0" algn="l" rtl="0">
@@ -7802,10 +7984,18 @@
               <a:buNone/>
             </a:pPr>
             <a:r>
-              <a:rPr lang="en"/>
+              <a:rPr lang="en" dirty="0">
+                <a:highlight>
+                  <a:srgbClr val="00FF00"/>
+                </a:highlight>
+              </a:rPr>
               <a:t>Feel free to add new endpoints that you find useful </a:t>
             </a:r>
-            <a:endParaRPr/>
+            <a:endParaRPr dirty="0">
+              <a:highlight>
+                <a:srgbClr val="00FF00"/>
+              </a:highlight>
+            </a:endParaRPr>
           </a:p>
         </p:txBody>
       </p:sp>
@@ -7919,10 +8109,10 @@
               <a:buNone/>
             </a:pPr>
             <a:r>
-              <a:rPr lang="en"/>
+              <a:rPr lang="en" dirty="0"/>
               <a:t>Write feature tests for all endpoints</a:t>
             </a:r>
-            <a:endParaRPr/>
+            <a:endParaRPr dirty="0"/>
           </a:p>
           <a:p>
             <a:pPr marL="0" lvl="0" indent="0" algn="l" rtl="0">
@@ -7935,10 +8125,10 @@
               <a:buNone/>
             </a:pPr>
             <a:r>
-              <a:rPr lang="en"/>
+              <a:rPr lang="en" dirty="0"/>
               <a:t>You can find information about testing here: https://laravel.com/docs/8.x/testing</a:t>
             </a:r>
-            <a:endParaRPr/>
+            <a:endParaRPr dirty="0"/>
           </a:p>
         </p:txBody>
       </p:sp>

</xml_diff>